<commit_message>
Update Updating drivers with DriverEasy.pptx
</commit_message>
<xml_diff>
--- a/Updating drivers with DriverEasy.pptx
+++ b/Updating drivers with DriverEasy.pptx
@@ -115,6 +115,11 @@
       </a:defRPr>
     </a:lvl9pPr>
   </p:defaultTextStyle>
+  <p:extLst>
+    <p:ext uri="{EFAFB233-063F-42B5-8137-9DF3F51BA10A}">
+      <p15:sldGuideLst xmlns:p15="http://schemas.microsoft.com/office/powerpoint/2012/main"/>
+    </p:ext>
+  </p:extLst>
 </p:presentation>
 </file>
 
@@ -123,7 +128,7 @@
   <pc:docChgLst>
     <pc:chgData name="Devin Wiggins" userId="8eac81e412118a53" providerId="LiveId" clId="{BE20815A-9A7B-44A7-B468-B97A5C1C0C0A}"/>
     <pc:docChg chg="undo custSel addSld modSld">
-      <pc:chgData name="Devin Wiggins" userId="8eac81e412118a53" providerId="LiveId" clId="{BE20815A-9A7B-44A7-B468-B97A5C1C0C0A}" dt="2020-10-15T18:32:39.179" v="3981" actId="20577"/>
+      <pc:chgData name="Devin Wiggins" userId="8eac81e412118a53" providerId="LiveId" clId="{BE20815A-9A7B-44A7-B468-B97A5C1C0C0A}" dt="2020-10-15T19:31:04.028" v="4045" actId="1076"/>
       <pc:docMkLst>
         <pc:docMk/>
       </pc:docMkLst>
@@ -276,7 +281,7 @@
         </pc:picChg>
       </pc:sldChg>
       <pc:sldChg chg="addSp delSp modSp new mod">
-        <pc:chgData name="Devin Wiggins" userId="8eac81e412118a53" providerId="LiveId" clId="{BE20815A-9A7B-44A7-B468-B97A5C1C0C0A}" dt="2020-10-15T18:26:54.308" v="3171" actId="1076"/>
+        <pc:chgData name="Devin Wiggins" userId="8eac81e412118a53" providerId="LiveId" clId="{BE20815A-9A7B-44A7-B468-B97A5C1C0C0A}" dt="2020-10-15T19:31:04.028" v="4045" actId="1076"/>
         <pc:sldMkLst>
           <pc:docMk/>
           <pc:sldMk cId="2430847854" sldId="267"/>
@@ -290,19 +295,27 @@
           </ac:spMkLst>
         </pc:spChg>
         <pc:spChg chg="mod">
-          <ac:chgData name="Devin Wiggins" userId="8eac81e412118a53" providerId="LiveId" clId="{BE20815A-9A7B-44A7-B468-B97A5C1C0C0A}" dt="2020-10-15T18:26:50.442" v="3169" actId="20577"/>
+          <ac:chgData name="Devin Wiggins" userId="8eac81e412118a53" providerId="LiveId" clId="{BE20815A-9A7B-44A7-B468-B97A5C1C0C0A}" dt="2020-10-15T19:30:59.654" v="4044" actId="20577"/>
           <ac:spMkLst>
             <pc:docMk/>
             <pc:sldMk cId="2430847854" sldId="267"/>
             <ac:spMk id="3" creationId="{BC2579B0-80D2-4D5E-A566-723B154FD2A5}"/>
           </ac:spMkLst>
         </pc:spChg>
-        <pc:picChg chg="add mod">
-          <ac:chgData name="Devin Wiggins" userId="8eac81e412118a53" providerId="LiveId" clId="{BE20815A-9A7B-44A7-B468-B97A5C1C0C0A}" dt="2020-10-15T18:22:43.801" v="2814" actId="1076"/>
+        <pc:picChg chg="add del mod">
+          <ac:chgData name="Devin Wiggins" userId="8eac81e412118a53" providerId="LiveId" clId="{BE20815A-9A7B-44A7-B468-B97A5C1C0C0A}" dt="2020-10-15T19:29:38.365" v="3982" actId="478"/>
           <ac:picMkLst>
             <pc:docMk/>
             <pc:sldMk cId="2430847854" sldId="267"/>
             <ac:picMk id="5" creationId="{FB79D92B-30D4-46B3-BA06-16B9327FF1F5}"/>
+          </ac:picMkLst>
+        </pc:picChg>
+        <pc:picChg chg="add mod">
+          <ac:chgData name="Devin Wiggins" userId="8eac81e412118a53" providerId="LiveId" clId="{BE20815A-9A7B-44A7-B468-B97A5C1C0C0A}" dt="2020-10-15T19:31:04.028" v="4045" actId="1076"/>
+          <ac:picMkLst>
+            <pc:docMk/>
+            <pc:sldMk cId="2430847854" sldId="267"/>
+            <ac:picMk id="6" creationId="{FCB5D17B-6C44-46BC-BFAA-F33F4C8CE38D}"/>
           </ac:picMkLst>
         </pc:picChg>
         <pc:picChg chg="add del">
@@ -4313,7 +4326,7 @@
             <a:pPr lvl="1"/>
             <a:r>
               <a:rPr lang="en-US" dirty="0"/>
-              <a:t>After you find the device that correlates with your driver, double click it to open the device properties, it should look like this</a:t>
+              <a:t>After you find the device that correlates with your driver, right click it to see the device options, it should look like the picture on the right</a:t>
             </a:r>
           </a:p>
           <a:p>
@@ -4365,36 +4378,6 @@
           </a:p>
         </p:txBody>
       </p:sp>
-      <p:pic>
-        <p:nvPicPr>
-          <p:cNvPr id="5" name="Picture 4">
-            <a:extLst>
-              <a:ext uri="{FF2B5EF4-FFF2-40B4-BE49-F238E27FC236}">
-                <a16:creationId xmlns:a16="http://schemas.microsoft.com/office/drawing/2014/main" id="{FB79D92B-30D4-46B3-BA06-16B9327FF1F5}"/>
-              </a:ext>
-            </a:extLst>
-          </p:cNvPr>
-          <p:cNvPicPr>
-            <a:picLocks noChangeAspect="1"/>
-          </p:cNvPicPr>
-          <p:nvPr/>
-        </p:nvPicPr>
-        <p:blipFill>
-          <a:blip r:embed="rId2"/>
-          <a:stretch>
-            <a:fillRect/>
-          </a:stretch>
-        </p:blipFill>
-        <p:spPr>
-          <a:xfrm>
-            <a:off x="8902588" y="2177319"/>
-            <a:ext cx="2192132" cy="2503361"/>
-          </a:xfrm>
-          <a:prstGeom prst="rect">
-            <a:avLst/>
-          </a:prstGeom>
-        </p:spPr>
-      </p:pic>
       <p:pic>
         <p:nvPicPr>
           <p:cNvPr id="9" name="Picture 8">
@@ -4410,7 +4393,7 @@
           <p:nvPr/>
         </p:nvPicPr>
         <p:blipFill>
-          <a:blip r:embed="rId3"/>
+          <a:blip r:embed="rId2"/>
           <a:stretch>
             <a:fillRect/>
           </a:stretch>
@@ -4440,7 +4423,7 @@
           <p:nvPr/>
         </p:nvPicPr>
         <p:blipFill>
-          <a:blip r:embed="rId4"/>
+          <a:blip r:embed="rId3"/>
           <a:stretch>
             <a:fillRect/>
           </a:stretch>
@@ -4449,6 +4432,36 @@
           <a:xfrm>
             <a:off x="1360625" y="4680680"/>
             <a:ext cx="4854361" cy="1005927"/>
+          </a:xfrm>
+          <a:prstGeom prst="rect">
+            <a:avLst/>
+          </a:prstGeom>
+        </p:spPr>
+      </p:pic>
+      <p:pic>
+        <p:nvPicPr>
+          <p:cNvPr id="6" name="Picture 5">
+            <a:extLst>
+              <a:ext uri="{FF2B5EF4-FFF2-40B4-BE49-F238E27FC236}">
+                <a16:creationId xmlns:a16="http://schemas.microsoft.com/office/drawing/2014/main" id="{FCB5D17B-6C44-46BC-BFAA-F33F4C8CE38D}"/>
+              </a:ext>
+            </a:extLst>
+          </p:cNvPr>
+          <p:cNvPicPr>
+            <a:picLocks noChangeAspect="1"/>
+          </p:cNvPicPr>
+          <p:nvPr/>
+        </p:nvPicPr>
+        <p:blipFill>
+          <a:blip r:embed="rId4"/>
+          <a:stretch>
+            <a:fillRect/>
+          </a:stretch>
+        </p:blipFill>
+        <p:spPr>
+          <a:xfrm>
+            <a:off x="8099173" y="2206672"/>
+            <a:ext cx="2721021" cy="1255430"/>
           </a:xfrm>
           <a:prstGeom prst="rect">
             <a:avLst/>

</xml_diff>